<commit_message>
Update powerpoints, finetune homework
</commit_message>
<xml_diff>
--- a/documentation/03_JavaAlapok/doc/13 Java alapok ismétlése - JVM és működése.pptx
+++ b/documentation/03_JavaAlapok/doc/13 Java alapok ismétlése - JVM és működése.pptx
@@ -18757,7 +18757,7 @@
               <a:buNone/>
             </a:pPr>
             <a:r>
-              <a:rPr b="0" i="1" lang="hu-HU" sz="1500" u="none" cap="none" strike="noStrike">
+              <a:rPr i="1" lang="hu-HU" sz="1500">
                 <a:solidFill>
                   <a:schemeClr val="lt1"/>
                 </a:solidFill>
@@ -18766,7 +18766,7 @@
                 <a:cs typeface="Calibri"/>
                 <a:sym typeface="Calibri"/>
               </a:rPr>
-              <a:t>Kis Bertalan</a:t>
+              <a:t>Farkas László</a:t>
             </a:r>
           </a:p>
           <a:p>
@@ -18780,22 +18780,21 @@
               <a:buClr>
                 <a:schemeClr val="lt1"/>
               </a:buClr>
-              <a:buSzPct val="25000"/>
               <a:buFont typeface="Arial"/>
               <a:buNone/>
             </a:pPr>
             <a:r>
-              <a:rPr b="0" i="1" lang="hu-HU" sz="1500" u="none" cap="none" strike="noStrike">
-                <a:solidFill>
-                  <a:schemeClr val="lt1"/>
-                </a:solidFill>
-                <a:latin typeface="Calibri"/>
-                <a:ea typeface="Calibri"/>
-                <a:cs typeface="Calibri"/>
-                <a:sym typeface="Calibri"/>
-              </a:rPr>
-              <a:t>Bertalan_Kis@epam.com</a:t>
+              <a:t/>
             </a:r>
+            <a:endParaRPr b="0" i="1" sz="1500" u="none" cap="none" strike="noStrike">
+              <a:solidFill>
+                <a:schemeClr val="lt1"/>
+              </a:solidFill>
+              <a:latin typeface="Calibri"/>
+              <a:ea typeface="Calibri"/>
+              <a:cs typeface="Calibri"/>
+              <a:sym typeface="Calibri"/>
+            </a:endParaRPr>
           </a:p>
         </p:txBody>
       </p:sp>
@@ -19223,7 +19222,7 @@
             <a:tbl>
               <a:tblPr>
                 <a:noFill/>
-                <a:tableStyleId>{09FFB301-9F25-4F6B-964A-4CD35049F1EF}</a:tableStyleId>
+                <a:tableStyleId>{27AD4566-775A-4E65-B2D3-06C065A56FCF}</a:tableStyleId>
               </a:tblPr>
               <a:tblGrid>
                 <a:gridCol w="4114800"/>

</xml_diff>